<commit_message>
EDA Slide => Edited to add content
</commit_message>
<xml_diff>
--- a/Final Submission/PPT Slides/EDA Slide.pptx
+++ b/Final Submission/PPT Slides/EDA Slide.pptx
@@ -104,6 +104,11 @@
       </a:defRPr>
     </a:lvl9pPr>
   </p:defaultTextStyle>
+  <p:extLst>
+    <p:ext uri="{EFAFB233-063F-42B5-8137-9DF3F51BA10A}">
+      <p15:sldGuideLst xmlns:p15="http://schemas.microsoft.com/office/powerpoint/2012/main"/>
+    </p:ext>
+  </p:extLst>
 </p:presentation>
 </file>
 
@@ -152,14 +157,14 @@
           </a:ln>
           <a:extLst>
             <a:ext uri="{909E8E84-426E-40dd-AFC4-6F175D3DCCD1}">
-              <a14:hiddenFill xmlns:a14="http://schemas.microsoft.com/office/drawing/2010/main" xmlns="">
+              <a14:hiddenFill xmlns="" xmlns:a14="http://schemas.microsoft.com/office/drawing/2010/main">
                 <a:solidFill>
                   <a:srgbClr val="FFFFFF"/>
                 </a:solidFill>
               </a14:hiddenFill>
             </a:ext>
             <a:ext uri="{91240B29-F687-4f45-9708-019B960494DF}">
-              <a14:hiddenLine xmlns:a14="http://schemas.microsoft.com/office/drawing/2010/main" xmlns="" w="9525">
+              <a14:hiddenLine xmlns="" xmlns:a14="http://schemas.microsoft.com/office/drawing/2010/main" w="9525">
                 <a:solidFill>
                   <a:srgbClr val="000000"/>
                 </a:solidFill>
@@ -377,14 +382,14 @@
           </a:ln>
           <a:extLst>
             <a:ext uri="{909E8E84-426E-40dd-AFC4-6F175D3DCCD1}">
-              <a14:hiddenFill xmlns:a14="http://schemas.microsoft.com/office/drawing/2010/main" xmlns="">
+              <a14:hiddenFill xmlns="" xmlns:a14="http://schemas.microsoft.com/office/drawing/2010/main">
                 <a:solidFill>
                   <a:srgbClr val="FFFFFF"/>
                 </a:solidFill>
               </a14:hiddenFill>
             </a:ext>
             <a:ext uri="{91240B29-F687-4f45-9708-019B960494DF}">
-              <a14:hiddenLine xmlns:a14="http://schemas.microsoft.com/office/drawing/2010/main" xmlns="" w="9525">
+              <a14:hiddenLine xmlns="" xmlns:a14="http://schemas.microsoft.com/office/drawing/2010/main" w="9525">
                 <a:solidFill>
                   <a:srgbClr val="000000"/>
                 </a:solidFill>
@@ -548,7 +553,7 @@
             <a:fld id="{1210D201-B81E-470F-A152-87DB35E113A8}" type="datetimeFigureOut">
               <a:rPr lang="en-US" altLang="en-US"/>
               <a:pPr/>
-              <a:t>3/29/2022</a:t>
+              <a:t>3/29/22</a:t>
             </a:fld>
             <a:endParaRPr lang="en-US" altLang="en-US"/>
           </a:p>
@@ -912,7 +917,7 @@
             <a:fld id="{065B2143-4885-47E3-A9EB-607A302E185E}" type="datetimeFigureOut">
               <a:rPr lang="en-US" altLang="en-US"/>
               <a:pPr/>
-              <a:t>3/29/2022</a:t>
+              <a:t>3/29/22</a:t>
             </a:fld>
             <a:endParaRPr lang="en-US" altLang="en-US"/>
           </a:p>
@@ -1195,7 +1200,7 @@
             <a:fld id="{FE7ACBF5-1757-4FA1-8770-7D42E8AB3403}" type="datetimeFigureOut">
               <a:rPr lang="en-US" altLang="en-US"/>
               <a:pPr/>
-              <a:t>3/29/2022</a:t>
+              <a:t>3/29/22</a:t>
             </a:fld>
             <a:endParaRPr lang="en-US" altLang="en-US"/>
           </a:p>
@@ -1526,7 +1531,7 @@
             <a:fld id="{31EC4CDC-1D50-43D9-92DD-EC1F6918FC5E}" type="datetimeFigureOut">
               <a:rPr lang="en-US" altLang="en-US"/>
               <a:pPr/>
-              <a:t>3/29/2022</a:t>
+              <a:t>3/29/22</a:t>
             </a:fld>
             <a:endParaRPr lang="en-US" altLang="en-US"/>
           </a:p>
@@ -1988,7 +1993,7 @@
             <a:fld id="{B29945B5-1676-4A4A-9769-87262D092169}" type="datetimeFigureOut">
               <a:rPr lang="en-US" altLang="en-US"/>
               <a:pPr/>
-              <a:t>3/29/2022</a:t>
+              <a:t>3/29/22</a:t>
             </a:fld>
             <a:endParaRPr lang="en-US" altLang="en-US"/>
           </a:p>
@@ -2154,7 +2159,7 @@
             <a:fld id="{15EA8BE1-029F-4049-94C0-3048ABCECBF1}" type="datetimeFigureOut">
               <a:rPr lang="en-US" altLang="en-US"/>
               <a:pPr/>
-              <a:t>3/29/2022</a:t>
+              <a:t>3/29/22</a:t>
             </a:fld>
             <a:endParaRPr lang="en-US" altLang="en-US"/>
           </a:p>
@@ -2284,7 +2289,7 @@
             <a:fld id="{AE94213C-83F6-4CB9-84A6-5E06AF59783F}" type="datetimeFigureOut">
               <a:rPr lang="en-US" altLang="en-US"/>
               <a:pPr/>
-              <a:t>3/29/2022</a:t>
+              <a:t>3/29/22</a:t>
             </a:fld>
             <a:endParaRPr lang="en-US" altLang="en-US"/>
           </a:p>
@@ -2597,7 +2602,7 @@
             <a:fld id="{923DF63F-B3A0-44E6-BDF4-2B9B8EC924BB}" type="datetimeFigureOut">
               <a:rPr lang="en-US" altLang="en-US"/>
               <a:pPr/>
-              <a:t>3/29/2022</a:t>
+              <a:t>3/29/22</a:t>
             </a:fld>
             <a:endParaRPr lang="en-US" altLang="en-US"/>
           </a:p>
@@ -2893,7 +2898,7 @@
             <a:fld id="{B151E1F3-2510-46B4-B4CA-F46EB747AB32}" type="datetimeFigureOut">
               <a:rPr lang="en-US" altLang="en-US"/>
               <a:pPr/>
-              <a:t>3/29/2022</a:t>
+              <a:t>3/29/22</a:t>
             </a:fld>
             <a:endParaRPr lang="en-US" altLang="en-US"/>
           </a:p>
@@ -3140,7 +3145,7 @@
             <a:fld id="{C11C1CF1-2F3A-4423-90F7-0EB150F19318}" type="datetimeFigureOut">
               <a:rPr lang="en-US" altLang="en-US"/>
               <a:pPr/>
-              <a:t>3/29/2022</a:t>
+              <a:t>3/29/22</a:t>
             </a:fld>
             <a:endParaRPr lang="en-US" altLang="en-US"/>
           </a:p>
@@ -3939,7 +3944,7 @@
                 </a:solidFill>
                 <a:latin typeface="Calibri"/>
               </a:rPr>
-              <a:t>Q2</a:t>
+              <a:t>Feature Engineering</a:t>
             </a:r>
           </a:p>
         </p:txBody>
@@ -4008,7 +4013,7 @@
                 </a:solidFill>
                 <a:latin typeface="Calibri"/>
               </a:rPr>
-              <a:t>Var</a:t>
+              <a:t>Transformation</a:t>
             </a:r>
           </a:p>
         </p:txBody>
@@ -4077,7 +4082,7 @@
                 </a:solidFill>
                 <a:latin typeface="Calibri"/>
               </a:rPr>
-              <a:t>Q4</a:t>
+              <a:t>Finding Patterns</a:t>
             </a:r>
           </a:p>
         </p:txBody>
@@ -4146,7 +4151,7 @@
                 </a:solidFill>
                 <a:latin typeface="Calibri"/>
               </a:rPr>
-              <a:t>Var</a:t>
+              <a:t>Data Cleaning</a:t>
             </a:r>
           </a:p>
         </p:txBody>
@@ -4888,7 +4893,10 @@
             </a:lvl9pPr>
           </a:lstStyle>
           <a:p>
-            <a:pPr algn="l"/>
+            <a:pPr marL="171450" indent="-171450" algn="l">
+              <a:buFontTx/>
+              <a:buChar char="-"/>
+            </a:pPr>
             <a:r>
               <a:rPr lang="en-US" dirty="0">
                 <a:solidFill>
@@ -4898,18 +4906,17 @@
                 </a:solidFill>
                 <a:latin typeface="Calibri"/>
               </a:rPr>
-              <a:t>Lorem ipsum dolor sit </a:t>
-            </a:r>
-            <a:r>
-              <a:rPr lang="en-US" dirty="0" err="1">
+              <a:t>Imputed missing values in Quantitative </a:t>
+            </a:r>
+            <a:r>
+              <a:rPr lang="en-US" dirty="0">
                 <a:solidFill>
                   <a:prstClr val="white">
                     <a:lumMod val="50000"/>
                   </a:prstClr>
                 </a:solidFill>
-                <a:latin typeface="Calibri"/>
               </a:rPr>
-              <a:t>amet</a:t>
+              <a:t>features</a:t>
             </a:r>
             <a:r>
               <a:rPr lang="en-US" dirty="0">
@@ -4920,10 +4927,16 @@
                 </a:solidFill>
                 <a:latin typeface="Calibri"/>
               </a:rPr>
-              <a:t>, </a:t>
-            </a:r>
-            <a:r>
-              <a:rPr lang="en-US" dirty="0" err="1">
+              <a:t> with their mean values.</a:t>
+            </a:r>
+          </a:p>
+          <a:p>
+            <a:pPr marL="171450" indent="-171450" algn="l">
+              <a:buFontTx/>
+              <a:buChar char="-"/>
+            </a:pPr>
+            <a:r>
+              <a:rPr lang="en-US" dirty="0">
                 <a:solidFill>
                   <a:prstClr val="white">
                     <a:lumMod val="50000"/>
@@ -4931,10 +4944,10 @@
                 </a:solidFill>
                 <a:latin typeface="Calibri"/>
               </a:rPr>
-              <a:t>consectetur</a:t>
-            </a:r>
-            <a:r>
-              <a:rPr lang="en-US" dirty="0">
+              <a:t>Eliminated an almost empty feature of ‘</a:t>
+            </a:r>
+            <a:r>
+              <a:rPr lang="en-US" i="1" dirty="0">
                 <a:solidFill>
                   <a:prstClr val="white">
                     <a:lumMod val="50000"/>
@@ -4942,10 +4955,10 @@
                 </a:solidFill>
                 <a:latin typeface="Calibri"/>
               </a:rPr>
-              <a:t> </a:t>
-            </a:r>
-            <a:r>
-              <a:rPr lang="en-US" dirty="0" err="1">
+              <a:t>Libertarian</a:t>
+            </a:r>
+            <a:r>
+              <a:rPr lang="en-US" dirty="0">
                 <a:solidFill>
                   <a:prstClr val="white">
                     <a:lumMod val="50000"/>
@@ -4953,96 +4966,8 @@
                 </a:solidFill>
                 <a:latin typeface="Calibri"/>
               </a:rPr>
-              <a:t>adipiscing</a:t>
-            </a:r>
-            <a:r>
-              <a:rPr lang="en-US" dirty="0">
-                <a:solidFill>
-                  <a:prstClr val="white">
-                    <a:lumMod val="50000"/>
-                  </a:prstClr>
-                </a:solidFill>
-                <a:latin typeface="Calibri"/>
-              </a:rPr>
-              <a:t> </a:t>
-            </a:r>
-            <a:r>
-              <a:rPr lang="en-US" dirty="0" err="1">
-                <a:solidFill>
-                  <a:prstClr val="white">
-                    <a:lumMod val="50000"/>
-                  </a:prstClr>
-                </a:solidFill>
-                <a:latin typeface="Calibri"/>
-              </a:rPr>
-              <a:t>elit</a:t>
-            </a:r>
-            <a:r>
-              <a:rPr lang="en-US" dirty="0">
-                <a:solidFill>
-                  <a:prstClr val="white">
-                    <a:lumMod val="50000"/>
-                  </a:prstClr>
-                </a:solidFill>
-                <a:latin typeface="Calibri"/>
-              </a:rPr>
-              <a:t>. </a:t>
-            </a:r>
-            <a:r>
-              <a:rPr lang="en-US" dirty="0" err="1">
-                <a:solidFill>
-                  <a:prstClr val="white">
-                    <a:lumMod val="50000"/>
-                  </a:prstClr>
-                </a:solidFill>
-                <a:latin typeface="Calibri"/>
-              </a:rPr>
-              <a:t>Aliquam</a:t>
-            </a:r>
-            <a:r>
-              <a:rPr lang="en-US" dirty="0">
-                <a:solidFill>
-                  <a:prstClr val="white">
-                    <a:lumMod val="50000"/>
-                  </a:prstClr>
-                </a:solidFill>
-                <a:latin typeface="Calibri"/>
-              </a:rPr>
-              <a:t> non </a:t>
-            </a:r>
-            <a:r>
-              <a:rPr lang="en-US" dirty="0" err="1">
-                <a:solidFill>
-                  <a:prstClr val="white">
-                    <a:lumMod val="50000"/>
-                  </a:prstClr>
-                </a:solidFill>
-                <a:latin typeface="Calibri"/>
-              </a:rPr>
-              <a:t>varius</a:t>
-            </a:r>
-            <a:r>
-              <a:rPr lang="en-US" dirty="0">
-                <a:solidFill>
-                  <a:prstClr val="white">
-                    <a:lumMod val="50000"/>
-                  </a:prstClr>
-                </a:solidFill>
-                <a:latin typeface="Calibri"/>
-              </a:rPr>
-              <a:t> ipsum.</a:t>
-            </a:r>
-          </a:p>
-          <a:p>
-            <a:pPr algn="l"/>
-            <a:endParaRPr lang="en-US" dirty="0">
-              <a:solidFill>
-                <a:prstClr val="white">
-                  <a:lumMod val="50000"/>
-                </a:prstClr>
-              </a:solidFill>
-              <a:latin typeface="Calibri"/>
-            </a:endParaRPr>
+              <a:t>’</a:t>
+            </a:r>
           </a:p>
         </p:txBody>
       </p:sp>
@@ -5224,152 +5149,56 @@
             </a:lvl9pPr>
           </a:lstStyle>
           <a:p>
+            <a:pPr marL="171450" indent="-171450">
+              <a:buFontTx/>
+              <a:buChar char="-"/>
+            </a:pPr>
+            <a:r>
+              <a:rPr lang="en-US" sz="1200" dirty="0">
+                <a:solidFill>
+                  <a:prstClr val="white">
+                    <a:lumMod val="50000"/>
+                  </a:prstClr>
+                </a:solidFill>
+                <a:latin typeface="Calibri"/>
+              </a:rPr>
+              <a:t>Merged additional data sets at county-level related to </a:t>
+            </a:r>
+            <a:r>
+              <a:rPr lang="en-US" sz="1200" i="1" dirty="0">
+                <a:solidFill>
+                  <a:prstClr val="white">
+                    <a:lumMod val="50000"/>
+                  </a:prstClr>
+                </a:solidFill>
+                <a:latin typeface="Calibri"/>
+              </a:rPr>
+              <a:t>Population, Race, Age, Region, Gender</a:t>
+            </a:r>
+            <a:r>
+              <a:rPr lang="en-US" sz="1200" dirty="0">
+                <a:solidFill>
+                  <a:prstClr val="white">
+                    <a:lumMod val="50000"/>
+                  </a:prstClr>
+                </a:solidFill>
+                <a:latin typeface="Calibri"/>
+              </a:rPr>
+              <a:t> to broaden dimensionality for our analysis.</a:t>
+            </a:r>
+          </a:p>
+          <a:p>
             <a:pPr marL="0" indent="0">
               <a:buNone/>
             </a:pPr>
-            <a:r>
-              <a:rPr lang="en-US" sz="1200" dirty="0">
-                <a:solidFill>
-                  <a:prstClr val="white">
-                    <a:lumMod val="50000"/>
-                  </a:prstClr>
-                </a:solidFill>
-                <a:latin typeface="Calibri"/>
-              </a:rPr>
-              <a:t>Lorem ipsum dolor sit </a:t>
-            </a:r>
-            <a:r>
-              <a:rPr lang="en-US" sz="1200" dirty="0" err="1">
-                <a:solidFill>
-                  <a:prstClr val="white">
-                    <a:lumMod val="50000"/>
-                  </a:prstClr>
-                </a:solidFill>
-                <a:latin typeface="Calibri"/>
-              </a:rPr>
-              <a:t>amet</a:t>
-            </a:r>
-            <a:r>
-              <a:rPr lang="en-US" sz="1200" dirty="0">
-                <a:solidFill>
-                  <a:prstClr val="white">
-                    <a:lumMod val="50000"/>
-                  </a:prstClr>
-                </a:solidFill>
-                <a:latin typeface="Calibri"/>
-              </a:rPr>
-              <a:t>, </a:t>
-            </a:r>
-            <a:r>
-              <a:rPr lang="en-US" sz="1200" dirty="0" err="1">
-                <a:solidFill>
-                  <a:prstClr val="white">
-                    <a:lumMod val="50000"/>
-                  </a:prstClr>
-                </a:solidFill>
-                <a:latin typeface="Calibri"/>
-              </a:rPr>
-              <a:t>consectetur</a:t>
-            </a:r>
-            <a:r>
-              <a:rPr lang="en-US" sz="1200" dirty="0">
-                <a:solidFill>
-                  <a:prstClr val="white">
-                    <a:lumMod val="50000"/>
-                  </a:prstClr>
-                </a:solidFill>
-                <a:latin typeface="Calibri"/>
-              </a:rPr>
-              <a:t> </a:t>
-            </a:r>
-            <a:r>
-              <a:rPr lang="en-US" sz="1200" dirty="0" err="1">
-                <a:solidFill>
-                  <a:prstClr val="white">
-                    <a:lumMod val="50000"/>
-                  </a:prstClr>
-                </a:solidFill>
-                <a:latin typeface="Calibri"/>
-              </a:rPr>
-              <a:t>adipiscing</a:t>
-            </a:r>
-            <a:r>
-              <a:rPr lang="en-US" sz="1200" dirty="0">
-                <a:solidFill>
-                  <a:prstClr val="white">
-                    <a:lumMod val="50000"/>
-                  </a:prstClr>
-                </a:solidFill>
-                <a:latin typeface="Calibri"/>
-              </a:rPr>
-              <a:t> </a:t>
-            </a:r>
-            <a:r>
-              <a:rPr lang="en-US" sz="1200" dirty="0" err="1">
-                <a:solidFill>
-                  <a:prstClr val="white">
-                    <a:lumMod val="50000"/>
-                  </a:prstClr>
-                </a:solidFill>
-                <a:latin typeface="Calibri"/>
-              </a:rPr>
-              <a:t>elit</a:t>
-            </a:r>
-            <a:r>
-              <a:rPr lang="en-US" sz="1200" dirty="0">
-                <a:solidFill>
-                  <a:prstClr val="white">
-                    <a:lumMod val="50000"/>
-                  </a:prstClr>
-                </a:solidFill>
-                <a:latin typeface="Calibri"/>
-              </a:rPr>
-              <a:t>. </a:t>
-            </a:r>
-            <a:r>
-              <a:rPr lang="en-US" sz="1200" dirty="0" err="1">
-                <a:solidFill>
-                  <a:prstClr val="white">
-                    <a:lumMod val="50000"/>
-                  </a:prstClr>
-                </a:solidFill>
-                <a:latin typeface="Calibri"/>
-              </a:rPr>
-              <a:t>Aliquam</a:t>
-            </a:r>
-            <a:r>
-              <a:rPr lang="en-US" sz="1200" dirty="0">
-                <a:solidFill>
-                  <a:prstClr val="white">
-                    <a:lumMod val="50000"/>
-                  </a:prstClr>
-                </a:solidFill>
-                <a:latin typeface="Calibri"/>
-              </a:rPr>
-              <a:t> non </a:t>
-            </a:r>
-            <a:r>
-              <a:rPr lang="en-US" sz="1200" dirty="0" err="1">
-                <a:solidFill>
-                  <a:prstClr val="white">
-                    <a:lumMod val="50000"/>
-                  </a:prstClr>
-                </a:solidFill>
-                <a:latin typeface="Calibri"/>
-              </a:rPr>
-              <a:t>varius</a:t>
-            </a:r>
-            <a:r>
-              <a:rPr lang="en-US" sz="1200" dirty="0">
-                <a:solidFill>
-                  <a:prstClr val="white">
-                    <a:lumMod val="50000"/>
-                  </a:prstClr>
-                </a:solidFill>
-                <a:latin typeface="Calibri"/>
-              </a:rPr>
-              <a:t> ipsum.</a:t>
-            </a:r>
+            <a:endParaRPr lang="en-US" sz="1200" dirty="0">
+              <a:solidFill>
+                <a:prstClr val="white">
+                  <a:lumMod val="50000"/>
+                </a:prstClr>
+              </a:solidFill>
+              <a:latin typeface="Calibri"/>
+            </a:endParaRPr>
           </a:p>
         </p:txBody>
       </p:sp>
@@ -5551,8 +5380,9 @@
             </a:lvl9pPr>
           </a:lstStyle>
           <a:p>
-            <a:pPr marL="0" indent="0">
-              <a:buNone/>
+            <a:pPr marL="171450" indent="-171450">
+              <a:buFontTx/>
+              <a:buChar char="-"/>
             </a:pPr>
             <a:r>
               <a:rPr lang="en-US" sz="1200" dirty="0">
@@ -5563,10 +5393,10 @@
                 </a:solidFill>
                 <a:latin typeface="Calibri"/>
               </a:rPr>
-              <a:t>Lorem ipsum dolor sit </a:t>
-            </a:r>
-            <a:r>
-              <a:rPr lang="en-US" sz="1200" dirty="0" err="1">
+              <a:t>Treatment of some character features as </a:t>
+            </a:r>
+            <a:r>
+              <a:rPr lang="en-US" sz="1200" i="1" dirty="0">
                 <a:solidFill>
                   <a:prstClr val="white">
                     <a:lumMod val="50000"/>
@@ -5574,7 +5404,7 @@
                 </a:solidFill>
                 <a:latin typeface="Calibri"/>
               </a:rPr>
-              <a:t>amet</a:t>
+              <a:t>Factors</a:t>
             </a:r>
             <a:r>
               <a:rPr lang="en-US" sz="1200" dirty="0">
@@ -5585,10 +5415,16 @@
                 </a:solidFill>
                 <a:latin typeface="Calibri"/>
               </a:rPr>
-              <a:t>, </a:t>
-            </a:r>
-            <a:r>
-              <a:rPr lang="en-US" sz="1200" dirty="0" err="1">
+              <a:t>.</a:t>
+            </a:r>
+          </a:p>
+          <a:p>
+            <a:pPr marL="171450" indent="-171450">
+              <a:buFontTx/>
+              <a:buChar char="-"/>
+            </a:pPr>
+            <a:r>
+              <a:rPr lang="en-US" sz="1200" dirty="0">
                 <a:solidFill>
                   <a:prstClr val="white">
                     <a:lumMod val="50000"/>
@@ -5596,106 +5432,7 @@
                 </a:solidFill>
                 <a:latin typeface="Calibri"/>
               </a:rPr>
-              <a:t>consectetur</a:t>
-            </a:r>
-            <a:r>
-              <a:rPr lang="en-US" sz="1200" dirty="0">
-                <a:solidFill>
-                  <a:prstClr val="white">
-                    <a:lumMod val="50000"/>
-                  </a:prstClr>
-                </a:solidFill>
-                <a:latin typeface="Calibri"/>
-              </a:rPr>
-              <a:t> </a:t>
-            </a:r>
-            <a:r>
-              <a:rPr lang="en-US" sz="1200" dirty="0" err="1">
-                <a:solidFill>
-                  <a:prstClr val="white">
-                    <a:lumMod val="50000"/>
-                  </a:prstClr>
-                </a:solidFill>
-                <a:latin typeface="Calibri"/>
-              </a:rPr>
-              <a:t>adipiscing</a:t>
-            </a:r>
-            <a:r>
-              <a:rPr lang="en-US" sz="1200" dirty="0">
-                <a:solidFill>
-                  <a:prstClr val="white">
-                    <a:lumMod val="50000"/>
-                  </a:prstClr>
-                </a:solidFill>
-                <a:latin typeface="Calibri"/>
-              </a:rPr>
-              <a:t> </a:t>
-            </a:r>
-            <a:r>
-              <a:rPr lang="en-US" sz="1200" dirty="0" err="1">
-                <a:solidFill>
-                  <a:prstClr val="white">
-                    <a:lumMod val="50000"/>
-                  </a:prstClr>
-                </a:solidFill>
-                <a:latin typeface="Calibri"/>
-              </a:rPr>
-              <a:t>elit</a:t>
-            </a:r>
-            <a:r>
-              <a:rPr lang="en-US" sz="1200" dirty="0">
-                <a:solidFill>
-                  <a:prstClr val="white">
-                    <a:lumMod val="50000"/>
-                  </a:prstClr>
-                </a:solidFill>
-                <a:latin typeface="Calibri"/>
-              </a:rPr>
-              <a:t>. </a:t>
-            </a:r>
-            <a:r>
-              <a:rPr lang="en-US" sz="1200" dirty="0" err="1">
-                <a:solidFill>
-                  <a:prstClr val="white">
-                    <a:lumMod val="50000"/>
-                  </a:prstClr>
-                </a:solidFill>
-                <a:latin typeface="Calibri"/>
-              </a:rPr>
-              <a:t>Aliquam</a:t>
-            </a:r>
-            <a:r>
-              <a:rPr lang="en-US" sz="1200" dirty="0">
-                <a:solidFill>
-                  <a:prstClr val="white">
-                    <a:lumMod val="50000"/>
-                  </a:prstClr>
-                </a:solidFill>
-                <a:latin typeface="Calibri"/>
-              </a:rPr>
-              <a:t> non </a:t>
-            </a:r>
-            <a:r>
-              <a:rPr lang="en-US" sz="1200" dirty="0" err="1">
-                <a:solidFill>
-                  <a:prstClr val="white">
-                    <a:lumMod val="50000"/>
-                  </a:prstClr>
-                </a:solidFill>
-                <a:latin typeface="Calibri"/>
-              </a:rPr>
-              <a:t>varius</a:t>
-            </a:r>
-            <a:r>
-              <a:rPr lang="en-US" sz="1200" dirty="0">
-                <a:solidFill>
-                  <a:prstClr val="white">
-                    <a:lumMod val="50000"/>
-                  </a:prstClr>
-                </a:solidFill>
-                <a:latin typeface="Calibri"/>
-              </a:rPr>
-              <a:t> ipsum.</a:t>
+              <a:t>Created new features from votes and its difference between the parties for winning probability in each county.</a:t>
             </a:r>
           </a:p>
         </p:txBody>
@@ -5878,8 +5615,9 @@
             </a:lvl9pPr>
           </a:lstStyle>
           <a:p>
-            <a:pPr marL="0" indent="0">
-              <a:buNone/>
+            <a:pPr marL="171450" indent="-171450">
+              <a:buFontTx/>
+              <a:buChar char="-"/>
             </a:pPr>
             <a:r>
               <a:rPr lang="en-US" sz="1200" dirty="0">
@@ -5890,139 +5628,7 @@
                 </a:solidFill>
                 <a:latin typeface="Calibri"/>
               </a:rPr>
-              <a:t>Lorem ipsum dolor sit </a:t>
-            </a:r>
-            <a:r>
-              <a:rPr lang="en-US" sz="1200" dirty="0" err="1">
-                <a:solidFill>
-                  <a:prstClr val="white">
-                    <a:lumMod val="50000"/>
-                  </a:prstClr>
-                </a:solidFill>
-                <a:latin typeface="Calibri"/>
-              </a:rPr>
-              <a:t>amet</a:t>
-            </a:r>
-            <a:r>
-              <a:rPr lang="en-US" sz="1200" dirty="0">
-                <a:solidFill>
-                  <a:prstClr val="white">
-                    <a:lumMod val="50000"/>
-                  </a:prstClr>
-                </a:solidFill>
-                <a:latin typeface="Calibri"/>
-              </a:rPr>
-              <a:t>, </a:t>
-            </a:r>
-            <a:r>
-              <a:rPr lang="en-US" sz="1200" dirty="0" err="1">
-                <a:solidFill>
-                  <a:prstClr val="white">
-                    <a:lumMod val="50000"/>
-                  </a:prstClr>
-                </a:solidFill>
-                <a:latin typeface="Calibri"/>
-              </a:rPr>
-              <a:t>consectetur</a:t>
-            </a:r>
-            <a:r>
-              <a:rPr lang="en-US" sz="1200" dirty="0">
-                <a:solidFill>
-                  <a:prstClr val="white">
-                    <a:lumMod val="50000"/>
-                  </a:prstClr>
-                </a:solidFill>
-                <a:latin typeface="Calibri"/>
-              </a:rPr>
-              <a:t> </a:t>
-            </a:r>
-            <a:r>
-              <a:rPr lang="en-US" sz="1200" dirty="0" err="1">
-                <a:solidFill>
-                  <a:prstClr val="white">
-                    <a:lumMod val="50000"/>
-                  </a:prstClr>
-                </a:solidFill>
-                <a:latin typeface="Calibri"/>
-              </a:rPr>
-              <a:t>adipiscing</a:t>
-            </a:r>
-            <a:r>
-              <a:rPr lang="en-US" sz="1200" dirty="0">
-                <a:solidFill>
-                  <a:prstClr val="white">
-                    <a:lumMod val="50000"/>
-                  </a:prstClr>
-                </a:solidFill>
-                <a:latin typeface="Calibri"/>
-              </a:rPr>
-              <a:t> </a:t>
-            </a:r>
-            <a:r>
-              <a:rPr lang="en-US" sz="1200" dirty="0" err="1">
-                <a:solidFill>
-                  <a:prstClr val="white">
-                    <a:lumMod val="50000"/>
-                  </a:prstClr>
-                </a:solidFill>
-                <a:latin typeface="Calibri"/>
-              </a:rPr>
-              <a:t>elit</a:t>
-            </a:r>
-            <a:r>
-              <a:rPr lang="en-US" sz="1200" dirty="0">
-                <a:solidFill>
-                  <a:prstClr val="white">
-                    <a:lumMod val="50000"/>
-                  </a:prstClr>
-                </a:solidFill>
-                <a:latin typeface="Calibri"/>
-              </a:rPr>
-              <a:t>. </a:t>
-            </a:r>
-            <a:r>
-              <a:rPr lang="en-US" sz="1200" dirty="0" err="1">
-                <a:solidFill>
-                  <a:prstClr val="white">
-                    <a:lumMod val="50000"/>
-                  </a:prstClr>
-                </a:solidFill>
-                <a:latin typeface="Calibri"/>
-              </a:rPr>
-              <a:t>Aliquam</a:t>
-            </a:r>
-            <a:r>
-              <a:rPr lang="en-US" sz="1200" dirty="0">
-                <a:solidFill>
-                  <a:prstClr val="white">
-                    <a:lumMod val="50000"/>
-                  </a:prstClr>
-                </a:solidFill>
-                <a:latin typeface="Calibri"/>
-              </a:rPr>
-              <a:t> non </a:t>
-            </a:r>
-            <a:r>
-              <a:rPr lang="en-US" sz="1200" dirty="0" err="1">
-                <a:solidFill>
-                  <a:prstClr val="white">
-                    <a:lumMod val="50000"/>
-                  </a:prstClr>
-                </a:solidFill>
-                <a:latin typeface="Calibri"/>
-              </a:rPr>
-              <a:t>varius</a:t>
-            </a:r>
-            <a:r>
-              <a:rPr lang="en-US" sz="1200" dirty="0">
-                <a:solidFill>
-                  <a:prstClr val="white">
-                    <a:lumMod val="50000"/>
-                  </a:prstClr>
-                </a:solidFill>
-                <a:latin typeface="Calibri"/>
-              </a:rPr>
-              <a:t> ipsum.</a:t>
+              <a:t>Visualized all the categorical and numeric features to identify relationships between them.</a:t>
             </a:r>
           </a:p>
         </p:txBody>

</xml_diff>